<commit_message>
UserGuide: Add section for set-based filter operators
</commit_message>
<xml_diff>
--- a/docs/diagrams/FilterUnitDiagramUG.pptx
+++ b/docs/diagrams/FilterUnitDiagramUG.pptx
@@ -5,10 +5,11 @@
     <p:sldMasterId id="2147483648" r:id="rId1"/>
   </p:sldMasterIdLst>
   <p:notesMasterIdLst>
-    <p:notesMasterId r:id="rId3"/>
+    <p:notesMasterId r:id="rId4"/>
   </p:notesMasterIdLst>
   <p:sldIdLst>
     <p:sldId id="267" r:id="rId2"/>
+    <p:sldId id="268" r:id="rId3"/>
   </p:sldIdLst>
   <p:sldSz cx="9144000" cy="6858000" type="screen4x3"/>
   <p:notesSz cx="6858000" cy="9144000"/>
@@ -212,7 +213,7 @@
           <a:p>
             <a:fld id="{F5CC4B3F-88C1-4FFA-B1B6-F41C21DC6924}" type="datetimeFigureOut">
               <a:rPr lang="en-US" smtClean="0"/>
-              <a:t>11/1/2018</a:t>
+              <a:t>11/3/2018</a:t>
             </a:fld>
             <a:endParaRPr lang="en-US"/>
           </a:p>
@@ -658,7 +659,7 @@
           <a:p>
             <a:fld id="{78C97017-6FC3-485B-9764-EAC9E56C1D49}" type="datetimeFigureOut">
               <a:rPr lang="en-US" smtClean="0"/>
-              <a:t>11/1/2018</a:t>
+              <a:t>11/3/2018</a:t>
             </a:fld>
             <a:endParaRPr lang="en-US"/>
           </a:p>
@@ -826,7 +827,7 @@
           <a:p>
             <a:fld id="{78C97017-6FC3-485B-9764-EAC9E56C1D49}" type="datetimeFigureOut">
               <a:rPr lang="en-US" smtClean="0"/>
-              <a:t>11/1/2018</a:t>
+              <a:t>11/3/2018</a:t>
             </a:fld>
             <a:endParaRPr lang="en-US"/>
           </a:p>
@@ -1004,7 +1005,7 @@
           <a:p>
             <a:fld id="{78C97017-6FC3-485B-9764-EAC9E56C1D49}" type="datetimeFigureOut">
               <a:rPr lang="en-US" smtClean="0"/>
-              <a:t>11/1/2018</a:t>
+              <a:t>11/3/2018</a:t>
             </a:fld>
             <a:endParaRPr lang="en-US"/>
           </a:p>
@@ -1172,7 +1173,7 @@
           <a:p>
             <a:fld id="{78C97017-6FC3-485B-9764-EAC9E56C1D49}" type="datetimeFigureOut">
               <a:rPr lang="en-US" smtClean="0"/>
-              <a:t>11/1/2018</a:t>
+              <a:t>11/3/2018</a:t>
             </a:fld>
             <a:endParaRPr lang="en-US"/>
           </a:p>
@@ -1417,7 +1418,7 @@
           <a:p>
             <a:fld id="{78C97017-6FC3-485B-9764-EAC9E56C1D49}" type="datetimeFigureOut">
               <a:rPr lang="en-US" smtClean="0"/>
-              <a:t>11/1/2018</a:t>
+              <a:t>11/3/2018</a:t>
             </a:fld>
             <a:endParaRPr lang="en-US"/>
           </a:p>
@@ -1702,7 +1703,7 @@
           <a:p>
             <a:fld id="{78C97017-6FC3-485B-9764-EAC9E56C1D49}" type="datetimeFigureOut">
               <a:rPr lang="en-US" smtClean="0"/>
-              <a:t>11/1/2018</a:t>
+              <a:t>11/3/2018</a:t>
             </a:fld>
             <a:endParaRPr lang="en-US"/>
           </a:p>
@@ -2121,7 +2122,7 @@
           <a:p>
             <a:fld id="{78C97017-6FC3-485B-9764-EAC9E56C1D49}" type="datetimeFigureOut">
               <a:rPr lang="en-US" smtClean="0"/>
-              <a:t>11/1/2018</a:t>
+              <a:t>11/3/2018</a:t>
             </a:fld>
             <a:endParaRPr lang="en-US"/>
           </a:p>
@@ -2238,7 +2239,7 @@
           <a:p>
             <a:fld id="{78C97017-6FC3-485B-9764-EAC9E56C1D49}" type="datetimeFigureOut">
               <a:rPr lang="en-US" smtClean="0"/>
-              <a:t>11/1/2018</a:t>
+              <a:t>11/3/2018</a:t>
             </a:fld>
             <a:endParaRPr lang="en-US"/>
           </a:p>
@@ -2333,7 +2334,7 @@
           <a:p>
             <a:fld id="{78C97017-6FC3-485B-9764-EAC9E56C1D49}" type="datetimeFigureOut">
               <a:rPr lang="en-US" smtClean="0"/>
-              <a:t>11/1/2018</a:t>
+              <a:t>11/3/2018</a:t>
             </a:fld>
             <a:endParaRPr lang="en-US"/>
           </a:p>
@@ -2608,7 +2609,7 @@
           <a:p>
             <a:fld id="{78C97017-6FC3-485B-9764-EAC9E56C1D49}" type="datetimeFigureOut">
               <a:rPr lang="en-US" smtClean="0"/>
-              <a:t>11/1/2018</a:t>
+              <a:t>11/3/2018</a:t>
             </a:fld>
             <a:endParaRPr lang="en-US"/>
           </a:p>
@@ -2860,7 +2861,7 @@
           <a:p>
             <a:fld id="{78C97017-6FC3-485B-9764-EAC9E56C1D49}" type="datetimeFigureOut">
               <a:rPr lang="en-US" smtClean="0"/>
-              <a:t>11/1/2018</a:t>
+              <a:t>11/3/2018</a:t>
             </a:fld>
             <a:endParaRPr lang="en-US"/>
           </a:p>
@@ -3071,7 +3072,7 @@
           <a:p>
             <a:fld id="{78C97017-6FC3-485B-9764-EAC9E56C1D49}" type="datetimeFigureOut">
               <a:rPr lang="en-US" smtClean="0"/>
-              <a:t>11/1/2018</a:t>
+              <a:t>11/3/2018</a:t>
             </a:fld>
             <a:endParaRPr lang="en-US"/>
           </a:p>
@@ -3772,6 +3773,452 @@
     <p:extLst>
       <p:ext uri="{BB962C8B-B14F-4D97-AF65-F5344CB8AC3E}">
         <p14:creationId xmlns:p14="http://schemas.microsoft.com/office/powerpoint/2010/main" val="3945898909"/>
+      </p:ext>
+    </p:extLst>
+  </p:cSld>
+  <p:clrMapOvr>
+    <a:masterClrMapping/>
+  </p:clrMapOvr>
+</p:sld>
+</file>
+
+<file path=ppt/slides/slide2.xml><?xml version="1.0" encoding="utf-8"?>
+<p:sld xmlns:a="http://schemas.openxmlformats.org/drawingml/2006/main" xmlns:r="http://schemas.openxmlformats.org/officeDocument/2006/relationships" xmlns:p="http://schemas.openxmlformats.org/presentationml/2006/main">
+  <p:cSld>
+    <p:spTree>
+      <p:nvGrpSpPr>
+        <p:cNvPr id="1" name=""/>
+        <p:cNvGrpSpPr/>
+        <p:nvPr/>
+      </p:nvGrpSpPr>
+      <p:grpSpPr>
+        <a:xfrm>
+          <a:off x="0" y="0"/>
+          <a:ext cx="0" cy="0"/>
+          <a:chOff x="0" y="0"/>
+          <a:chExt cx="0" cy="0"/>
+        </a:xfrm>
+      </p:grpSpPr>
+      <p:sp>
+        <p:nvSpPr>
+          <p:cNvPr id="61" name="TextBox 60"/>
+          <p:cNvSpPr txBox="1"/>
+          <p:nvPr/>
+        </p:nvSpPr>
+        <p:spPr>
+          <a:xfrm>
+            <a:off x="2771294" y="2510135"/>
+            <a:ext cx="1713931" cy="461665"/>
+          </a:xfrm>
+          <a:prstGeom prst="rect">
+            <a:avLst/>
+          </a:prstGeom>
+          <a:solidFill>
+            <a:schemeClr val="bg1">
+              <a:lumMod val="85000"/>
+            </a:schemeClr>
+          </a:solidFill>
+          <a:ln w="28575">
+            <a:noFill/>
+          </a:ln>
+        </p:spPr>
+        <p:txBody>
+          <a:bodyPr wrap="none" rtlCol="0">
+            <a:spAutoFit/>
+          </a:bodyPr>
+          <a:lstStyle/>
+          <a:p>
+            <a:r>
+              <a:rPr lang="en-US" sz="2400" b="1" dirty="0" smtClean="0">
+                <a:solidFill>
+                  <a:schemeClr val="accent2">
+                    <a:lumMod val="75000"/>
+                  </a:schemeClr>
+                </a:solidFill>
+                <a:latin typeface="Consolas" panose="020B0609020204030204" pitchFamily="49" charset="0"/>
+              </a:rPr>
+              <a:t>t</a:t>
+            </a:r>
+            <a:r>
+              <a:rPr lang="en-US" sz="2400" b="1" dirty="0" smtClean="0">
+                <a:solidFill>
+                  <a:schemeClr val="accent4">
+                    <a:lumMod val="75000"/>
+                  </a:schemeClr>
+                </a:solidFill>
+                <a:latin typeface="Consolas" panose="020B0609020204030204" pitchFamily="49" charset="0"/>
+              </a:rPr>
+              <a:t>:</a:t>
+            </a:r>
+            <a:r>
+              <a:rPr lang="en-US" sz="2400" b="1" dirty="0" smtClean="0">
+                <a:solidFill>
+                  <a:schemeClr val="accent3">
+                    <a:lumMod val="75000"/>
+                  </a:schemeClr>
+                </a:solidFill>
+                <a:latin typeface="Consolas" panose="020B0609020204030204" pitchFamily="49" charset="0"/>
+              </a:rPr>
+              <a:t>=</a:t>
+            </a:r>
+            <a:r>
+              <a:rPr lang="en-US" sz="2400" b="1" dirty="0" smtClean="0">
+                <a:solidFill>
+                  <a:schemeClr val="accent1">
+                    <a:lumMod val="75000"/>
+                  </a:schemeClr>
+                </a:solidFill>
+                <a:latin typeface="Consolas" panose="020B0609020204030204" pitchFamily="49" charset="0"/>
+              </a:rPr>
+              <a:t>CS2101</a:t>
+            </a:r>
+            <a:endParaRPr lang="en-SG" sz="2400" b="1" dirty="0">
+              <a:solidFill>
+                <a:schemeClr val="accent1">
+                  <a:lumMod val="75000"/>
+                </a:schemeClr>
+              </a:solidFill>
+              <a:latin typeface="Consolas" panose="020B0609020204030204" pitchFamily="49" charset="0"/>
+            </a:endParaRPr>
+          </a:p>
+        </p:txBody>
+      </p:sp>
+      <p:sp>
+        <p:nvSpPr>
+          <p:cNvPr id="7" name="TextBox 6"/>
+          <p:cNvSpPr txBox="1"/>
+          <p:nvPr/>
+        </p:nvSpPr>
+        <p:spPr>
+          <a:xfrm>
+            <a:off x="2420473" y="3420208"/>
+            <a:ext cx="406971" cy="276999"/>
+          </a:xfrm>
+          <a:prstGeom prst="rect">
+            <a:avLst/>
+          </a:prstGeom>
+          <a:solidFill>
+            <a:schemeClr val="accent2">
+              <a:lumMod val="20000"/>
+              <a:lumOff val="80000"/>
+            </a:schemeClr>
+          </a:solidFill>
+          <a:ln w="28575">
+            <a:solidFill>
+              <a:schemeClr val="accent2">
+                <a:lumMod val="75000"/>
+              </a:schemeClr>
+            </a:solidFill>
+          </a:ln>
+        </p:spPr>
+        <p:txBody>
+          <a:bodyPr wrap="none" rtlCol="0">
+            <a:spAutoFit/>
+          </a:bodyPr>
+          <a:lstStyle/>
+          <a:p>
+            <a:pPr algn="ctr"/>
+            <a:r>
+              <a:rPr lang="en-US" sz="1200" dirty="0" smtClean="0"/>
+              <a:t>Key</a:t>
+            </a:r>
+            <a:endParaRPr lang="en-SG" sz="1200" dirty="0"/>
+          </a:p>
+        </p:txBody>
+      </p:sp>
+      <p:cxnSp>
+        <p:nvCxnSpPr>
+          <p:cNvPr id="9" name="Straight Arrow Connector 8"/>
+          <p:cNvCxnSpPr>
+            <a:stCxn id="7" idx="0"/>
+          </p:cNvCxnSpPr>
+          <p:nvPr/>
+        </p:nvCxnSpPr>
+        <p:spPr>
+          <a:xfrm flipV="1">
+            <a:off x="2623959" y="2895600"/>
+            <a:ext cx="297711" cy="524608"/>
+          </a:xfrm>
+          <a:prstGeom prst="straightConnector1">
+            <a:avLst/>
+          </a:prstGeom>
+          <a:ln w="28575">
+            <a:solidFill>
+              <a:schemeClr val="accent2">
+                <a:lumMod val="75000"/>
+              </a:schemeClr>
+            </a:solidFill>
+            <a:tailEnd type="triangle"/>
+          </a:ln>
+        </p:spPr>
+        <p:style>
+          <a:lnRef idx="1">
+            <a:schemeClr val="accent1"/>
+          </a:lnRef>
+          <a:fillRef idx="0">
+            <a:schemeClr val="accent1"/>
+          </a:fillRef>
+          <a:effectRef idx="0">
+            <a:schemeClr val="accent1"/>
+          </a:effectRef>
+          <a:fontRef idx="minor">
+            <a:schemeClr val="tx1"/>
+          </a:fontRef>
+        </p:style>
+      </p:cxnSp>
+      <p:sp>
+        <p:nvSpPr>
+          <p:cNvPr id="48" name="TextBox 47"/>
+          <p:cNvSpPr txBox="1"/>
+          <p:nvPr/>
+        </p:nvSpPr>
+        <p:spPr>
+          <a:xfrm>
+            <a:off x="2517654" y="4051747"/>
+            <a:ext cx="963277" cy="276999"/>
+          </a:xfrm>
+          <a:prstGeom prst="rect">
+            <a:avLst/>
+          </a:prstGeom>
+          <a:solidFill>
+            <a:schemeClr val="accent4">
+              <a:lumMod val="20000"/>
+              <a:lumOff val="80000"/>
+            </a:schemeClr>
+          </a:solidFill>
+          <a:ln w="28575">
+            <a:solidFill>
+              <a:schemeClr val="accent4">
+                <a:lumMod val="75000"/>
+              </a:schemeClr>
+            </a:solidFill>
+          </a:ln>
+        </p:spPr>
+        <p:txBody>
+          <a:bodyPr wrap="none" rtlCol="0">
+            <a:spAutoFit/>
+          </a:bodyPr>
+          <a:lstStyle/>
+          <a:p>
+            <a:pPr algn="ctr"/>
+            <a:r>
+              <a:rPr lang="en-US" sz="1200" dirty="0" smtClean="0"/>
+              <a:t>Set operator</a:t>
+            </a:r>
+            <a:endParaRPr lang="en-SG" sz="1200" dirty="0"/>
+          </a:p>
+        </p:txBody>
+      </p:sp>
+      <p:cxnSp>
+        <p:nvCxnSpPr>
+          <p:cNvPr id="51" name="Straight Arrow Connector 50"/>
+          <p:cNvCxnSpPr>
+            <a:stCxn id="48" idx="0"/>
+          </p:cNvCxnSpPr>
+          <p:nvPr/>
+        </p:nvCxnSpPr>
+        <p:spPr>
+          <a:xfrm flipV="1">
+            <a:off x="2999293" y="2895600"/>
+            <a:ext cx="105054" cy="1156147"/>
+          </a:xfrm>
+          <a:prstGeom prst="straightConnector1">
+            <a:avLst/>
+          </a:prstGeom>
+          <a:ln w="28575">
+            <a:solidFill>
+              <a:schemeClr val="accent4">
+                <a:lumMod val="75000"/>
+              </a:schemeClr>
+            </a:solidFill>
+            <a:tailEnd type="triangle"/>
+          </a:ln>
+        </p:spPr>
+        <p:style>
+          <a:lnRef idx="1">
+            <a:schemeClr val="accent1"/>
+          </a:lnRef>
+          <a:fillRef idx="0">
+            <a:schemeClr val="accent1"/>
+          </a:fillRef>
+          <a:effectRef idx="0">
+            <a:schemeClr val="accent1"/>
+          </a:effectRef>
+          <a:fontRef idx="minor">
+            <a:schemeClr val="tx1"/>
+          </a:fontRef>
+        </p:style>
+      </p:cxnSp>
+      <p:sp>
+        <p:nvSpPr>
+          <p:cNvPr id="54" name="TextBox 53"/>
+          <p:cNvSpPr txBox="1"/>
+          <p:nvPr/>
+        </p:nvSpPr>
+        <p:spPr>
+          <a:xfrm>
+            <a:off x="4171192" y="3429000"/>
+            <a:ext cx="606321" cy="276999"/>
+          </a:xfrm>
+          <a:prstGeom prst="rect">
+            <a:avLst/>
+          </a:prstGeom>
+          <a:solidFill>
+            <a:schemeClr val="accent1">
+              <a:lumMod val="20000"/>
+              <a:lumOff val="80000"/>
+            </a:schemeClr>
+          </a:solidFill>
+          <a:ln w="28575">
+            <a:solidFill>
+              <a:schemeClr val="accent1">
+                <a:lumMod val="75000"/>
+              </a:schemeClr>
+            </a:solidFill>
+          </a:ln>
+        </p:spPr>
+        <p:txBody>
+          <a:bodyPr wrap="none" rtlCol="0">
+            <a:spAutoFit/>
+          </a:bodyPr>
+          <a:lstStyle/>
+          <a:p>
+            <a:pPr algn="ctr"/>
+            <a:r>
+              <a:rPr lang="en-US" sz="1200" dirty="0" smtClean="0"/>
+              <a:t>Phrase</a:t>
+            </a:r>
+            <a:endParaRPr lang="en-SG" sz="1200" dirty="0"/>
+          </a:p>
+        </p:txBody>
+      </p:sp>
+      <p:cxnSp>
+        <p:nvCxnSpPr>
+          <p:cNvPr id="55" name="Straight Arrow Connector 54"/>
+          <p:cNvCxnSpPr>
+            <a:stCxn id="54" idx="0"/>
+          </p:cNvCxnSpPr>
+          <p:nvPr/>
+        </p:nvCxnSpPr>
+        <p:spPr>
+          <a:xfrm flipH="1" flipV="1">
+            <a:off x="3988515" y="2895600"/>
+            <a:ext cx="485838" cy="533400"/>
+          </a:xfrm>
+          <a:prstGeom prst="straightConnector1">
+            <a:avLst/>
+          </a:prstGeom>
+          <a:ln w="28575">
+            <a:solidFill>
+              <a:schemeClr val="accent1">
+                <a:lumMod val="75000"/>
+              </a:schemeClr>
+            </a:solidFill>
+            <a:tailEnd type="triangle"/>
+          </a:ln>
+        </p:spPr>
+        <p:style>
+          <a:lnRef idx="1">
+            <a:schemeClr val="accent1"/>
+          </a:lnRef>
+          <a:fillRef idx="0">
+            <a:schemeClr val="accent1"/>
+          </a:fillRef>
+          <a:effectRef idx="0">
+            <a:schemeClr val="accent1"/>
+          </a:effectRef>
+          <a:fontRef idx="minor">
+            <a:schemeClr val="tx1"/>
+          </a:fontRef>
+        </p:style>
+      </p:cxnSp>
+      <p:sp>
+        <p:nvSpPr>
+          <p:cNvPr id="10" name="TextBox 9"/>
+          <p:cNvSpPr txBox="1"/>
+          <p:nvPr/>
+        </p:nvSpPr>
+        <p:spPr>
+          <a:xfrm>
+            <a:off x="3651724" y="4051747"/>
+            <a:ext cx="1063496" cy="276999"/>
+          </a:xfrm>
+          <a:prstGeom prst="rect">
+            <a:avLst/>
+          </a:prstGeom>
+          <a:solidFill>
+            <a:schemeClr val="accent3">
+              <a:lumMod val="20000"/>
+              <a:lumOff val="80000"/>
+            </a:schemeClr>
+          </a:solidFill>
+          <a:ln w="28575">
+            <a:solidFill>
+              <a:schemeClr val="accent3">
+                <a:lumMod val="75000"/>
+              </a:schemeClr>
+            </a:solidFill>
+          </a:ln>
+        </p:spPr>
+        <p:txBody>
+          <a:bodyPr wrap="none" rtlCol="0">
+            <a:spAutoFit/>
+          </a:bodyPr>
+          <a:lstStyle/>
+          <a:p>
+            <a:pPr algn="ctr"/>
+            <a:r>
+              <a:rPr lang="en-US" sz="1200" dirty="0" smtClean="0"/>
+              <a:t>Field operator</a:t>
+            </a:r>
+            <a:endParaRPr lang="en-SG" sz="1200" dirty="0"/>
+          </a:p>
+        </p:txBody>
+      </p:sp>
+      <p:cxnSp>
+        <p:nvCxnSpPr>
+          <p:cNvPr id="11" name="Straight Arrow Connector 10"/>
+          <p:cNvCxnSpPr>
+            <a:stCxn id="10" idx="0"/>
+          </p:cNvCxnSpPr>
+          <p:nvPr/>
+        </p:nvCxnSpPr>
+        <p:spPr>
+          <a:xfrm flipH="1" flipV="1">
+            <a:off x="3309083" y="2895600"/>
+            <a:ext cx="874389" cy="1156147"/>
+          </a:xfrm>
+          <a:prstGeom prst="straightConnector1">
+            <a:avLst/>
+          </a:prstGeom>
+          <a:ln w="28575">
+            <a:solidFill>
+              <a:schemeClr val="accent3">
+                <a:lumMod val="75000"/>
+              </a:schemeClr>
+            </a:solidFill>
+            <a:tailEnd type="triangle"/>
+          </a:ln>
+        </p:spPr>
+        <p:style>
+          <a:lnRef idx="1">
+            <a:schemeClr val="accent1"/>
+          </a:lnRef>
+          <a:fillRef idx="0">
+            <a:schemeClr val="accent1"/>
+          </a:fillRef>
+          <a:effectRef idx="0">
+            <a:schemeClr val="accent1"/>
+          </a:effectRef>
+          <a:fontRef idx="minor">
+            <a:schemeClr val="tx1"/>
+          </a:fontRef>
+        </p:style>
+      </p:cxnSp>
+    </p:spTree>
+    <p:extLst>
+      <p:ext uri="{BB962C8B-B14F-4D97-AF65-F5344CB8AC3E}">
+        <p14:creationId xmlns:p14="http://schemas.microsoft.com/office/powerpoint/2010/main" val="398142350"/>
       </p:ext>
     </p:extLst>
   </p:cSld>

</xml_diff>